<commit_message>
mods to the FODO use case
verified correct execution on Windows/cygwin
put Elegant generated output files into new directory .../output_files/
updated README
cleaned up input files; made initial energy consistent, etc.
</commit_message>
<xml_diff>
--- a/use_cases/elegant/fodo/fodo.pptx
+++ b/use_cases/elegant/fodo/fodo.pptx
@@ -305,7 +305,7 @@
           <a:p>
             <a:fld id="{DA4FAA51-2059-4E4D-9591-637494CA0B59}" type="datetimeFigureOut">
               <a:rPr lang="en-US" smtClean="0"/>
-              <a:t>5/1/2015</a:t>
+              <a:t>5/2/2015</a:t>
             </a:fld>
             <a:endParaRPr lang="en-US"/>
           </a:p>
@@ -475,7 +475,7 @@
           <a:p>
             <a:fld id="{DA4FAA51-2059-4E4D-9591-637494CA0B59}" type="datetimeFigureOut">
               <a:rPr lang="en-US" smtClean="0"/>
-              <a:t>5/1/2015</a:t>
+              <a:t>5/2/2015</a:t>
             </a:fld>
             <a:endParaRPr lang="en-US"/>
           </a:p>
@@ -655,7 +655,7 @@
           <a:p>
             <a:fld id="{DA4FAA51-2059-4E4D-9591-637494CA0B59}" type="datetimeFigureOut">
               <a:rPr lang="en-US" smtClean="0"/>
-              <a:t>5/1/2015</a:t>
+              <a:t>5/2/2015</a:t>
             </a:fld>
             <a:endParaRPr lang="en-US"/>
           </a:p>
@@ -825,7 +825,7 @@
           <a:p>
             <a:fld id="{DA4FAA51-2059-4E4D-9591-637494CA0B59}" type="datetimeFigureOut">
               <a:rPr lang="en-US" smtClean="0"/>
-              <a:t>5/1/2015</a:t>
+              <a:t>5/2/2015</a:t>
             </a:fld>
             <a:endParaRPr lang="en-US"/>
           </a:p>
@@ -1071,7 +1071,7 @@
           <a:p>
             <a:fld id="{DA4FAA51-2059-4E4D-9591-637494CA0B59}" type="datetimeFigureOut">
               <a:rPr lang="en-US" smtClean="0"/>
-              <a:t>5/1/2015</a:t>
+              <a:t>5/2/2015</a:t>
             </a:fld>
             <a:endParaRPr lang="en-US"/>
           </a:p>
@@ -1359,7 +1359,7 @@
           <a:p>
             <a:fld id="{DA4FAA51-2059-4E4D-9591-637494CA0B59}" type="datetimeFigureOut">
               <a:rPr lang="en-US" smtClean="0"/>
-              <a:t>5/1/2015</a:t>
+              <a:t>5/2/2015</a:t>
             </a:fld>
             <a:endParaRPr lang="en-US"/>
           </a:p>
@@ -1781,7 +1781,7 @@
           <a:p>
             <a:fld id="{DA4FAA51-2059-4E4D-9591-637494CA0B59}" type="datetimeFigureOut">
               <a:rPr lang="en-US" smtClean="0"/>
-              <a:t>5/1/2015</a:t>
+              <a:t>5/2/2015</a:t>
             </a:fld>
             <a:endParaRPr lang="en-US"/>
           </a:p>
@@ -1899,7 +1899,7 @@
           <a:p>
             <a:fld id="{DA4FAA51-2059-4E4D-9591-637494CA0B59}" type="datetimeFigureOut">
               <a:rPr lang="en-US" smtClean="0"/>
-              <a:t>5/1/2015</a:t>
+              <a:t>5/2/2015</a:t>
             </a:fld>
             <a:endParaRPr lang="en-US"/>
           </a:p>
@@ -1994,7 +1994,7 @@
           <a:p>
             <a:fld id="{DA4FAA51-2059-4E4D-9591-637494CA0B59}" type="datetimeFigureOut">
               <a:rPr lang="en-US" smtClean="0"/>
-              <a:t>5/1/2015</a:t>
+              <a:t>5/2/2015</a:t>
             </a:fld>
             <a:endParaRPr lang="en-US"/>
           </a:p>
@@ -2271,7 +2271,7 @@
           <a:p>
             <a:fld id="{DA4FAA51-2059-4E4D-9591-637494CA0B59}" type="datetimeFigureOut">
               <a:rPr lang="en-US" smtClean="0"/>
-              <a:t>5/1/2015</a:t>
+              <a:t>5/2/2015</a:t>
             </a:fld>
             <a:endParaRPr lang="en-US"/>
           </a:p>
@@ -2524,7 +2524,7 @@
           <a:p>
             <a:fld id="{DA4FAA51-2059-4E4D-9591-637494CA0B59}" type="datetimeFigureOut">
               <a:rPr lang="en-US" smtClean="0"/>
-              <a:t>5/1/2015</a:t>
+              <a:t>5/2/2015</a:t>
             </a:fld>
             <a:endParaRPr lang="en-US"/>
           </a:p>
@@ -2737,7 +2737,7 @@
           <a:p>
             <a:fld id="{DA4FAA51-2059-4E4D-9591-637494CA0B59}" type="datetimeFigureOut">
               <a:rPr lang="en-US" smtClean="0"/>
-              <a:t>5/1/2015</a:t>
+              <a:t>5/2/2015</a:t>
             </a:fld>
             <a:endParaRPr lang="en-US"/>
           </a:p>
@@ -3215,7 +3215,7 @@
         <p:spPr>
           <a:xfrm>
             <a:off x="2021598" y="2804783"/>
-            <a:ext cx="6054093" cy="1754326"/>
+            <a:ext cx="5711435" cy="1754326"/>
           </a:xfrm>
           <a:prstGeom prst="rect">
             <a:avLst/>
@@ -3254,18 +3254,22 @@
             </a:r>
             <a:r>
               <a:rPr lang="en-US" smtClean="0"/>
-              <a:t>2 </a:t>
-            </a:r>
-            <a:r>
-              <a:rPr lang="en-US" smtClean="0"/>
-              <a:t>micron</a:t>
+              <a:t>2 micron</a:t>
             </a:r>
             <a:endParaRPr lang="en-US" dirty="0" smtClean="0"/>
           </a:p>
           <a:p>
             <a:r>
               <a:rPr lang="en-US" smtClean="0"/>
-              <a:t>     Twiss beta (x,y) = 0.02 m</a:t>
+              <a:t>     Twiss beta (x,y) = </a:t>
+            </a:r>
+            <a:r>
+              <a:rPr lang="en-US" smtClean="0"/>
+              <a:t>2.5 </a:t>
+            </a:r>
+            <a:r>
+              <a:rPr lang="en-US" smtClean="0"/>
+              <a:t>m</a:t>
             </a:r>
           </a:p>
           <a:p>
@@ -3274,7 +3278,7 @@
           <a:p>
             <a:r>
               <a:rPr lang="en-US" smtClean="0"/>
-              <a:t>verify that </a:t>
+              <a:t>verify:  </a:t>
             </a:r>
             <a:r>
               <a:rPr lang="en-US"/>
@@ -3870,11 +3874,7 @@
             </a:r>
             <a:r>
               <a:rPr lang="en-US" sz="2000" smtClean="0"/>
-              <a:t>:   </a:t>
-            </a:r>
-            <a:r>
-              <a:rPr lang="en-US" sz="2000" smtClean="0"/>
-              <a:t>Create a new beamline, consisting of 10 FODO cells </a:t>
+              <a:t>:   Create a new beamline, consisting of 10 FODO cells </a:t>
             </a:r>
             <a:endParaRPr lang="en-US" sz="2000" dirty="0"/>
           </a:p>
@@ -3932,11 +3932,7 @@
             </a:r>
             <a:r>
               <a:rPr lang="en-US" smtClean="0"/>
-              <a:t>: </a:t>
-            </a:r>
-            <a:r>
-              <a:rPr lang="en-US" smtClean="0"/>
-              <a:t> </a:t>
+              <a:t>:  </a:t>
             </a:r>
             <a:r>
               <a:rPr lang="en-US" smtClean="0">

</xml_diff>

<commit_message>
minor changes to use case description
</commit_message>
<xml_diff>
--- a/use_cases/elegant/fodo/fodo.pptx
+++ b/use_cases/elegant/fodo/fodo.pptx
@@ -305,7 +305,7 @@
           <a:p>
             <a:fld id="{DA4FAA51-2059-4E4D-9591-637494CA0B59}" type="datetimeFigureOut">
               <a:rPr lang="en-US" smtClean="0"/>
-              <a:t>5/2/2015</a:t>
+              <a:t>5/3/2015</a:t>
             </a:fld>
             <a:endParaRPr lang="en-US"/>
           </a:p>
@@ -475,7 +475,7 @@
           <a:p>
             <a:fld id="{DA4FAA51-2059-4E4D-9591-637494CA0B59}" type="datetimeFigureOut">
               <a:rPr lang="en-US" smtClean="0"/>
-              <a:t>5/2/2015</a:t>
+              <a:t>5/3/2015</a:t>
             </a:fld>
             <a:endParaRPr lang="en-US"/>
           </a:p>
@@ -655,7 +655,7 @@
           <a:p>
             <a:fld id="{DA4FAA51-2059-4E4D-9591-637494CA0B59}" type="datetimeFigureOut">
               <a:rPr lang="en-US" smtClean="0"/>
-              <a:t>5/2/2015</a:t>
+              <a:t>5/3/2015</a:t>
             </a:fld>
             <a:endParaRPr lang="en-US"/>
           </a:p>
@@ -825,7 +825,7 @@
           <a:p>
             <a:fld id="{DA4FAA51-2059-4E4D-9591-637494CA0B59}" type="datetimeFigureOut">
               <a:rPr lang="en-US" smtClean="0"/>
-              <a:t>5/2/2015</a:t>
+              <a:t>5/3/2015</a:t>
             </a:fld>
             <a:endParaRPr lang="en-US"/>
           </a:p>
@@ -1071,7 +1071,7 @@
           <a:p>
             <a:fld id="{DA4FAA51-2059-4E4D-9591-637494CA0B59}" type="datetimeFigureOut">
               <a:rPr lang="en-US" smtClean="0"/>
-              <a:t>5/2/2015</a:t>
+              <a:t>5/3/2015</a:t>
             </a:fld>
             <a:endParaRPr lang="en-US"/>
           </a:p>
@@ -1359,7 +1359,7 @@
           <a:p>
             <a:fld id="{DA4FAA51-2059-4E4D-9591-637494CA0B59}" type="datetimeFigureOut">
               <a:rPr lang="en-US" smtClean="0"/>
-              <a:t>5/2/2015</a:t>
+              <a:t>5/3/2015</a:t>
             </a:fld>
             <a:endParaRPr lang="en-US"/>
           </a:p>
@@ -1781,7 +1781,7 @@
           <a:p>
             <a:fld id="{DA4FAA51-2059-4E4D-9591-637494CA0B59}" type="datetimeFigureOut">
               <a:rPr lang="en-US" smtClean="0"/>
-              <a:t>5/2/2015</a:t>
+              <a:t>5/3/2015</a:t>
             </a:fld>
             <a:endParaRPr lang="en-US"/>
           </a:p>
@@ -1899,7 +1899,7 @@
           <a:p>
             <a:fld id="{DA4FAA51-2059-4E4D-9591-637494CA0B59}" type="datetimeFigureOut">
               <a:rPr lang="en-US" smtClean="0"/>
-              <a:t>5/2/2015</a:t>
+              <a:t>5/3/2015</a:t>
             </a:fld>
             <a:endParaRPr lang="en-US"/>
           </a:p>
@@ -1994,7 +1994,7 @@
           <a:p>
             <a:fld id="{DA4FAA51-2059-4E4D-9591-637494CA0B59}" type="datetimeFigureOut">
               <a:rPr lang="en-US" smtClean="0"/>
-              <a:t>5/2/2015</a:t>
+              <a:t>5/3/2015</a:t>
             </a:fld>
             <a:endParaRPr lang="en-US"/>
           </a:p>
@@ -2271,7 +2271,7 @@
           <a:p>
             <a:fld id="{DA4FAA51-2059-4E4D-9591-637494CA0B59}" type="datetimeFigureOut">
               <a:rPr lang="en-US" smtClean="0"/>
-              <a:t>5/2/2015</a:t>
+              <a:t>5/3/2015</a:t>
             </a:fld>
             <a:endParaRPr lang="en-US"/>
           </a:p>
@@ -2524,7 +2524,7 @@
           <a:p>
             <a:fld id="{DA4FAA51-2059-4E4D-9591-637494CA0B59}" type="datetimeFigureOut">
               <a:rPr lang="en-US" smtClean="0"/>
-              <a:t>5/2/2015</a:t>
+              <a:t>5/3/2015</a:t>
             </a:fld>
             <a:endParaRPr lang="en-US"/>
           </a:p>
@@ -2737,7 +2737,7 @@
           <a:p>
             <a:fld id="{DA4FAA51-2059-4E4D-9591-637494CA0B59}" type="datetimeFigureOut">
               <a:rPr lang="en-US" smtClean="0"/>
-              <a:t>5/2/2015</a:t>
+              <a:t>5/3/2015</a:t>
             </a:fld>
             <a:endParaRPr lang="en-US"/>
           </a:p>

</xml_diff>